<commit_message>
se añaden presentación powerpoint, corregido milicioso :v
</commit_message>
<xml_diff>
--- a/Seguridad_de_aplicaciones_web.pptx
+++ b/Seguridad_de_aplicaciones_web.pptx
@@ -232,7 +232,7 @@
   </p:defaultTextStyle>
   <p:extLst>
     <p:ext uri="{EFAFB233-063F-42B5-8137-9DF3F51BA10A}">
-      <p15:sldGuideLst xmlns="" xmlns:p15="http://schemas.microsoft.com/office/powerpoint/2012/main"/>
+      <p15:sldGuideLst xmlns:p15="http://schemas.microsoft.com/office/powerpoint/2012/main" xmlns=""/>
     </p:ext>
   </p:extLst>
 </p:presentation>
@@ -418,7 +418,7 @@
     </p:spTree>
     <p:extLst>
       <p:ext uri="{BB962C8B-B14F-4D97-AF65-F5344CB8AC3E}">
-        <p14:creationId xmlns="" xmlns:p14="http://schemas.microsoft.com/office/powerpoint/2010/main" val="3954009524"/>
+        <p14:creationId xmlns:p14="http://schemas.microsoft.com/office/powerpoint/2010/main" xmlns="" val="3954009524"/>
       </p:ext>
     </p:extLst>
   </p:cSld>
@@ -614,7 +614,7 @@
     </p:spTree>
     <p:extLst>
       <p:ext uri="{BB962C8B-B14F-4D97-AF65-F5344CB8AC3E}">
-        <p14:creationId xmlns="" xmlns:p14="http://schemas.microsoft.com/office/powerpoint/2010/main" val="2575898211"/>
+        <p14:creationId xmlns:p14="http://schemas.microsoft.com/office/powerpoint/2010/main" xmlns="" val="2575898211"/>
       </p:ext>
     </p:extLst>
   </p:cSld>
@@ -720,7 +720,7 @@
     </p:spTree>
     <p:extLst>
       <p:ext uri="{BB962C8B-B14F-4D97-AF65-F5344CB8AC3E}">
-        <p14:creationId xmlns="" xmlns:p14="http://schemas.microsoft.com/office/powerpoint/2010/main" val="3361996585"/>
+        <p14:creationId xmlns:p14="http://schemas.microsoft.com/office/powerpoint/2010/main" xmlns="" val="3361996585"/>
       </p:ext>
     </p:extLst>
   </p:cSld>
@@ -826,7 +826,7 @@
     </p:spTree>
     <p:extLst>
       <p:ext uri="{BB962C8B-B14F-4D97-AF65-F5344CB8AC3E}">
-        <p14:creationId xmlns="" xmlns:p14="http://schemas.microsoft.com/office/powerpoint/2010/main" val="1683026041"/>
+        <p14:creationId xmlns:p14="http://schemas.microsoft.com/office/powerpoint/2010/main" xmlns="" val="1683026041"/>
       </p:ext>
     </p:extLst>
   </p:cSld>
@@ -932,7 +932,7 @@
     </p:spTree>
     <p:extLst>
       <p:ext uri="{BB962C8B-B14F-4D97-AF65-F5344CB8AC3E}">
-        <p14:creationId xmlns="" xmlns:p14="http://schemas.microsoft.com/office/powerpoint/2010/main" val="3361996585"/>
+        <p14:creationId xmlns:p14="http://schemas.microsoft.com/office/powerpoint/2010/main" xmlns="" val="3361996585"/>
       </p:ext>
     </p:extLst>
   </p:cSld>
@@ -1038,7 +1038,7 @@
     </p:spTree>
     <p:extLst>
       <p:ext uri="{BB962C8B-B14F-4D97-AF65-F5344CB8AC3E}">
-        <p14:creationId xmlns="" xmlns:p14="http://schemas.microsoft.com/office/powerpoint/2010/main" val="1683026041"/>
+        <p14:creationId xmlns:p14="http://schemas.microsoft.com/office/powerpoint/2010/main" xmlns="" val="1683026041"/>
       </p:ext>
     </p:extLst>
   </p:cSld>
@@ -1144,7 +1144,7 @@
     </p:spTree>
     <p:extLst>
       <p:ext uri="{BB962C8B-B14F-4D97-AF65-F5344CB8AC3E}">
-        <p14:creationId xmlns="" xmlns:p14="http://schemas.microsoft.com/office/powerpoint/2010/main" val="3361996585"/>
+        <p14:creationId xmlns:p14="http://schemas.microsoft.com/office/powerpoint/2010/main" xmlns="" val="3361996585"/>
       </p:ext>
     </p:extLst>
   </p:cSld>
@@ -1250,7 +1250,7 @@
     </p:spTree>
     <p:extLst>
       <p:ext uri="{BB962C8B-B14F-4D97-AF65-F5344CB8AC3E}">
-        <p14:creationId xmlns="" xmlns:p14="http://schemas.microsoft.com/office/powerpoint/2010/main" val="1803485106"/>
+        <p14:creationId xmlns:p14="http://schemas.microsoft.com/office/powerpoint/2010/main" xmlns="" val="1803485106"/>
       </p:ext>
     </p:extLst>
   </p:cSld>
@@ -1356,7 +1356,7 @@
     </p:spTree>
     <p:extLst>
       <p:ext uri="{BB962C8B-B14F-4D97-AF65-F5344CB8AC3E}">
-        <p14:creationId xmlns="" xmlns:p14="http://schemas.microsoft.com/office/powerpoint/2010/main" val="2878881066"/>
+        <p14:creationId xmlns:p14="http://schemas.microsoft.com/office/powerpoint/2010/main" xmlns="" val="2878881066"/>
       </p:ext>
     </p:extLst>
   </p:cSld>
@@ -1462,7 +1462,7 @@
     </p:spTree>
     <p:extLst>
       <p:ext uri="{BB962C8B-B14F-4D97-AF65-F5344CB8AC3E}">
-        <p14:creationId xmlns="" xmlns:p14="http://schemas.microsoft.com/office/powerpoint/2010/main" val="3361996585"/>
+        <p14:creationId xmlns:p14="http://schemas.microsoft.com/office/powerpoint/2010/main" xmlns="" val="3361996585"/>
       </p:ext>
     </p:extLst>
   </p:cSld>
@@ -1568,7 +1568,7 @@
     </p:spTree>
     <p:extLst>
       <p:ext uri="{BB962C8B-B14F-4D97-AF65-F5344CB8AC3E}">
-        <p14:creationId xmlns="" xmlns:p14="http://schemas.microsoft.com/office/powerpoint/2010/main" val="4278346267"/>
+        <p14:creationId xmlns:p14="http://schemas.microsoft.com/office/powerpoint/2010/main" xmlns="" val="4278346267"/>
       </p:ext>
     </p:extLst>
   </p:cSld>
@@ -1674,7 +1674,7 @@
     </p:spTree>
     <p:extLst>
       <p:ext uri="{BB962C8B-B14F-4D97-AF65-F5344CB8AC3E}">
-        <p14:creationId xmlns="" xmlns:p14="http://schemas.microsoft.com/office/powerpoint/2010/main" val="3361996585"/>
+        <p14:creationId xmlns:p14="http://schemas.microsoft.com/office/powerpoint/2010/main" xmlns="" val="3361996585"/>
       </p:ext>
     </p:extLst>
   </p:cSld>
@@ -1780,7 +1780,7 @@
     </p:spTree>
     <p:extLst>
       <p:ext uri="{BB962C8B-B14F-4D97-AF65-F5344CB8AC3E}">
-        <p14:creationId xmlns="" xmlns:p14="http://schemas.microsoft.com/office/powerpoint/2010/main" val="1683026041"/>
+        <p14:creationId xmlns:p14="http://schemas.microsoft.com/office/powerpoint/2010/main" xmlns="" val="1683026041"/>
       </p:ext>
     </p:extLst>
   </p:cSld>
@@ -1886,7 +1886,7 @@
     </p:spTree>
     <p:extLst>
       <p:ext uri="{BB962C8B-B14F-4D97-AF65-F5344CB8AC3E}">
-        <p14:creationId xmlns="" xmlns:p14="http://schemas.microsoft.com/office/powerpoint/2010/main" val="3361996585"/>
+        <p14:creationId xmlns:p14="http://schemas.microsoft.com/office/powerpoint/2010/main" xmlns="" val="3361996585"/>
       </p:ext>
     </p:extLst>
   </p:cSld>
@@ -1992,7 +1992,7 @@
     </p:spTree>
     <p:extLst>
       <p:ext uri="{BB962C8B-B14F-4D97-AF65-F5344CB8AC3E}">
-        <p14:creationId xmlns="" xmlns:p14="http://schemas.microsoft.com/office/powerpoint/2010/main" val="1683026041"/>
+        <p14:creationId xmlns:p14="http://schemas.microsoft.com/office/powerpoint/2010/main" xmlns="" val="1683026041"/>
       </p:ext>
     </p:extLst>
   </p:cSld>
@@ -5347,15 +5347,7 @@
                   <a:schemeClr val="bg1"/>
                 </a:solidFill>
               </a:rPr>
-              <a:t>Robert </a:t>
-            </a:r>
-            <a:r>
-              <a:rPr lang="es" sz="2400" b="1" dirty="0" smtClean="0">
-                <a:solidFill>
-                  <a:schemeClr val="bg1"/>
-                </a:solidFill>
-              </a:rPr>
-              <a:t>Rozas Navarro</a:t>
+              <a:t>Robert Rozas Navarro</a:t>
             </a:r>
           </a:p>
           <a:p>
@@ -5645,7 +5637,15 @@
             </a:pPr>
             <a:r>
               <a:rPr lang="es" dirty="0" smtClean="0"/>
-              <a:t>Carga de Archivos Miliciosos</a:t>
+              <a:t>Carga de </a:t>
+            </a:r>
+            <a:r>
+              <a:rPr lang="es" smtClean="0"/>
+              <a:t>Archivos </a:t>
+            </a:r>
+            <a:r>
+              <a:rPr lang="es" smtClean="0"/>
+              <a:t>Maliciosos</a:t>
             </a:r>
             <a:endParaRPr lang="es" dirty="0"/>
           </a:p>
@@ -6942,7 +6942,7 @@
     </p:spTree>
     <p:extLst>
       <p:ext uri="{BB962C8B-B14F-4D97-AF65-F5344CB8AC3E}">
-        <p14:creationId xmlns="" xmlns:p14="http://schemas.microsoft.com/office/powerpoint/2010/main" val="1721025396"/>
+        <p14:creationId xmlns:p14="http://schemas.microsoft.com/office/powerpoint/2010/main" xmlns="" val="1721025396"/>
       </p:ext>
     </p:extLst>
   </p:cSld>
@@ -7155,7 +7155,7 @@
     </p:spTree>
     <p:extLst>
       <p:ext uri="{BB962C8B-B14F-4D97-AF65-F5344CB8AC3E}">
-        <p14:creationId xmlns="" xmlns:p14="http://schemas.microsoft.com/office/powerpoint/2010/main" val="1875998454"/>
+        <p14:creationId xmlns:p14="http://schemas.microsoft.com/office/powerpoint/2010/main" xmlns="" val="1875998454"/>
       </p:ext>
     </p:extLst>
   </p:cSld>
@@ -7515,37 +7515,7 @@
                 <a:cs typeface="Trebuchet MS"/>
                 <a:sym typeface="Trebuchet MS"/>
               </a:rPr>
-              <a:t>. </a:t>
-            </a:r>
-            <a:r>
-              <a:rPr lang="es" dirty="0" smtClean="0">
-                <a:solidFill>
-                  <a:srgbClr val="333333"/>
-                </a:solidFill>
-                <a:highlight>
-                  <a:srgbClr val="FFFFFF"/>
-                </a:highlight>
-                <a:latin typeface="+mj-lt"/>
-                <a:ea typeface="Trebuchet MS"/>
-                <a:cs typeface="Trebuchet MS"/>
-                <a:sym typeface="Trebuchet MS"/>
-              </a:rPr>
-              <a:t>La </a:t>
-            </a:r>
-            <a:r>
-              <a:rPr lang="es" dirty="0" smtClean="0">
-                <a:solidFill>
-                  <a:srgbClr val="333333"/>
-                </a:solidFill>
-                <a:highlight>
-                  <a:srgbClr val="FFFFFF"/>
-                </a:highlight>
-                <a:latin typeface="+mj-lt"/>
-                <a:ea typeface="Trebuchet MS"/>
-                <a:cs typeface="Trebuchet MS"/>
-                <a:sym typeface="Trebuchet MS"/>
-              </a:rPr>
-              <a:t>mayoría </a:t>
+              <a:t>. La mayoría </a:t>
             </a:r>
             <a:r>
               <a:rPr lang="es" dirty="0">

</xml_diff>